<commit_message>
Reset PPTs and Unit Maps
</commit_message>
<xml_diff>
--- a/curriculum/Unit1/Unit 1 Slides.pptx
+++ b/curriculum/Unit1/Unit 1 Slides.pptx
@@ -8371,18 +8371,28 @@
 </file>
 
 <file path=customXml/item3.xml><?xml version="1.0" encoding="utf-8"?>
-<ct:contentTypeSchema xmlns:ct="http://schemas.microsoft.com/office/2006/metadata/contentType" xmlns:ma="http://schemas.microsoft.com/office/2006/metadata/properties/metaAttributes" ct:_="" ma:_="" ma:contentTypeName="Document" ma:contentTypeID="0x010100BABADD3A0624AA4E97287821B8F4D7D6" ma:contentTypeVersion="3" ma:contentTypeDescription="Create a new document." ma:contentTypeScope="" ma:versionID="e0073545f5cddffb46c9fa8d01738dd8">
-  <xsd:schema xmlns:xsd="http://www.w3.org/2001/XMLSchema" xmlns:xs="http://www.w3.org/2001/XMLSchema" xmlns:p="http://schemas.microsoft.com/office/2006/metadata/properties" xmlns:ns2="5edd459b-714d-42ed-b78f-512da7d1c14e" targetNamespace="http://schemas.microsoft.com/office/2006/metadata/properties" ma:root="true" ma:fieldsID="5b223eadad92f795ae696ccb91d8f218" ns2:_="">
-    <xsd:import namespace="5edd459b-714d-42ed-b78f-512da7d1c14e"/>
+<ct:contentTypeSchema xmlns:ct="http://schemas.microsoft.com/office/2006/metadata/contentType" xmlns:ma="http://schemas.microsoft.com/office/2006/metadata/properties/metaAttributes" ct:_="" ma:_="" ma:contentTypeName="Document" ma:contentTypeID="0x01010011E83E049C87AC4AB56F27089B4ACA55" ma:contentTypeVersion="12" ma:contentTypeDescription="Create a new document." ma:contentTypeScope="" ma:versionID="1178fe99ddca204d3fc8224f4ed0acf8">
+  <xsd:schema xmlns:xsd="http://www.w3.org/2001/XMLSchema" xmlns:xs="http://www.w3.org/2001/XMLSchema" xmlns:p="http://schemas.microsoft.com/office/2006/metadata/properties" xmlns:ns2="be898649-fe57-4b08-9fd4-31fc752880e3" xmlns:ns3="6f430b7c-f2e9-4385-9cb2-4dd06cc2317e" targetNamespace="http://schemas.microsoft.com/office/2006/metadata/properties" ma:root="true" ma:fieldsID="05a700af6660b82c6e85ae510b7169e9" ns2:_="" ns3:_="">
+    <xsd:import namespace="be898649-fe57-4b08-9fd4-31fc752880e3"/>
+    <xsd:import namespace="6f430b7c-f2e9-4385-9cb2-4dd06cc2317e"/>
     <xsd:element name="properties">
       <xsd:complexType>
         <xsd:sequence>
           <xsd:element name="documentManagement">
             <xsd:complexType>
               <xsd:all>
-                <xsd:element ref="ns2:SharedWithUsers" minOccurs="0"/>
-                <xsd:element ref="ns2:SharedWithDetails" minOccurs="0"/>
-                <xsd:element ref="ns2:SharingHintHash" minOccurs="0"/>
+                <xsd:element ref="ns2:MediaServiceMetadata" minOccurs="0"/>
+                <xsd:element ref="ns2:MediaServiceFastMetadata" minOccurs="0"/>
+                <xsd:element ref="ns2:MediaServiceAutoTags" minOccurs="0"/>
+                <xsd:element ref="ns2:MediaServiceDateTaken" minOccurs="0"/>
+                <xsd:element ref="ns3:SharedWithUsers" minOccurs="0"/>
+                <xsd:element ref="ns3:SharedWithDetails" minOccurs="0"/>
+                <xsd:element ref="ns2:MediaServiceLocation" minOccurs="0"/>
+                <xsd:element ref="ns2:MediaServiceOCR" minOccurs="0"/>
+                <xsd:element ref="ns2:MediaServiceEventHashCode" minOccurs="0"/>
+                <xsd:element ref="ns2:MediaServiceGenerationTime" minOccurs="0"/>
+                <xsd:element ref="ns2:MediaServiceAutoKeyPoints" minOccurs="0"/>
+                <xsd:element ref="ns2:MediaServiceKeyPoints" minOccurs="0"/>
               </xsd:all>
             </xsd:complexType>
           </xsd:element>
@@ -8390,10 +8400,68 @@
       </xsd:complexType>
     </xsd:element>
   </xsd:schema>
-  <xsd:schema xmlns:xsd="http://www.w3.org/2001/XMLSchema" xmlns:xs="http://www.w3.org/2001/XMLSchema" xmlns:dms="http://schemas.microsoft.com/office/2006/documentManagement/types" xmlns:pc="http://schemas.microsoft.com/office/infopath/2007/PartnerControls" targetNamespace="5edd459b-714d-42ed-b78f-512da7d1c14e" elementFormDefault="qualified">
+  <xsd:schema xmlns:xsd="http://www.w3.org/2001/XMLSchema" xmlns:xs="http://www.w3.org/2001/XMLSchema" xmlns:dms="http://schemas.microsoft.com/office/2006/documentManagement/types" xmlns:pc="http://schemas.microsoft.com/office/infopath/2007/PartnerControls" targetNamespace="be898649-fe57-4b08-9fd4-31fc752880e3" elementFormDefault="qualified">
     <xsd:import namespace="http://schemas.microsoft.com/office/2006/documentManagement/types"/>
     <xsd:import namespace="http://schemas.microsoft.com/office/infopath/2007/PartnerControls"/>
-    <xsd:element name="SharedWithUsers" ma:index="8" nillable="true" ma:displayName="Shared With" ma:internalName="SharedWithUsers" ma:readOnly="true">
+    <xsd:element name="MediaServiceMetadata" ma:index="8" nillable="true" ma:displayName="MediaServiceMetadata" ma:description="" ma:hidden="true" ma:internalName="MediaServiceMetadata" ma:readOnly="true">
+      <xsd:simpleType>
+        <xsd:restriction base="dms:Note"/>
+      </xsd:simpleType>
+    </xsd:element>
+    <xsd:element name="MediaServiceFastMetadata" ma:index="9" nillable="true" ma:displayName="MediaServiceFastMetadata" ma:description="" ma:hidden="true" ma:internalName="MediaServiceFastMetadata" ma:readOnly="true">
+      <xsd:simpleType>
+        <xsd:restriction base="dms:Note"/>
+      </xsd:simpleType>
+    </xsd:element>
+    <xsd:element name="MediaServiceAutoTags" ma:index="10" nillable="true" ma:displayName="MediaServiceAutoTags" ma:description="" ma:internalName="MediaServiceAutoTags" ma:readOnly="true">
+      <xsd:simpleType>
+        <xsd:restriction base="dms:Text"/>
+      </xsd:simpleType>
+    </xsd:element>
+    <xsd:element name="MediaServiceDateTaken" ma:index="11" nillable="true" ma:displayName="MediaServiceDateTaken" ma:description="" ma:hidden="true" ma:internalName="MediaServiceDateTaken" ma:readOnly="true">
+      <xsd:simpleType>
+        <xsd:restriction base="dms:Text"/>
+      </xsd:simpleType>
+    </xsd:element>
+    <xsd:element name="MediaServiceLocation" ma:index="14" nillable="true" ma:displayName="MediaServiceLocation" ma:internalName="MediaServiceLocation" ma:readOnly="true">
+      <xsd:simpleType>
+        <xsd:restriction base="dms:Text"/>
+      </xsd:simpleType>
+    </xsd:element>
+    <xsd:element name="MediaServiceOCR" ma:index="15" nillable="true" ma:displayName="MediaServiceOCR" ma:internalName="MediaServiceOCR" ma:readOnly="true">
+      <xsd:simpleType>
+        <xsd:restriction base="dms:Note">
+          <xsd:maxLength value="255"/>
+        </xsd:restriction>
+      </xsd:simpleType>
+    </xsd:element>
+    <xsd:element name="MediaServiceEventHashCode" ma:index="16" nillable="true" ma:displayName="MediaServiceEventHashCode" ma:hidden="true" ma:internalName="MediaServiceEventHashCode" ma:readOnly="true">
+      <xsd:simpleType>
+        <xsd:restriction base="dms:Text"/>
+      </xsd:simpleType>
+    </xsd:element>
+    <xsd:element name="MediaServiceGenerationTime" ma:index="17" nillable="true" ma:displayName="MediaServiceGenerationTime" ma:hidden="true" ma:internalName="MediaServiceGenerationTime" ma:readOnly="true">
+      <xsd:simpleType>
+        <xsd:restriction base="dms:Text"/>
+      </xsd:simpleType>
+    </xsd:element>
+    <xsd:element name="MediaServiceAutoKeyPoints" ma:index="18" nillable="true" ma:displayName="MediaServiceAutoKeyPoints" ma:hidden="true" ma:internalName="MediaServiceAutoKeyPoints" ma:readOnly="true">
+      <xsd:simpleType>
+        <xsd:restriction base="dms:Note"/>
+      </xsd:simpleType>
+    </xsd:element>
+    <xsd:element name="MediaServiceKeyPoints" ma:index="19" nillable="true" ma:displayName="KeyPoints" ma:internalName="MediaServiceKeyPoints" ma:readOnly="true">
+      <xsd:simpleType>
+        <xsd:restriction base="dms:Note">
+          <xsd:maxLength value="255"/>
+        </xsd:restriction>
+      </xsd:simpleType>
+    </xsd:element>
+  </xsd:schema>
+  <xsd:schema xmlns:xsd="http://www.w3.org/2001/XMLSchema" xmlns:xs="http://www.w3.org/2001/XMLSchema" xmlns:dms="http://schemas.microsoft.com/office/2006/documentManagement/types" xmlns:pc="http://schemas.microsoft.com/office/infopath/2007/PartnerControls" targetNamespace="6f430b7c-f2e9-4385-9cb2-4dd06cc2317e" elementFormDefault="qualified">
+    <xsd:import namespace="http://schemas.microsoft.com/office/2006/documentManagement/types"/>
+    <xsd:import namespace="http://schemas.microsoft.com/office/infopath/2007/PartnerControls"/>
+    <xsd:element name="SharedWithUsers" ma:index="12" nillable="true" ma:displayName="Shared With" ma:internalName="SharedWithUsers" ma:readOnly="true">
       <xsd:complexType>
         <xsd:complexContent>
           <xsd:extension base="dms:UserMulti">
@@ -8412,16 +8480,11 @@
         </xsd:complexContent>
       </xsd:complexType>
     </xsd:element>
-    <xsd:element name="SharedWithDetails" ma:index="9" nillable="true" ma:displayName="Shared With Details" ma:internalName="SharedWithDetails" ma:readOnly="true">
+    <xsd:element name="SharedWithDetails" ma:index="13" nillable="true" ma:displayName="Shared With Details" ma:internalName="SharedWithDetails" ma:readOnly="true">
       <xsd:simpleType>
         <xsd:restriction base="dms:Note">
           <xsd:maxLength value="255"/>
         </xsd:restriction>
-      </xsd:simpleType>
-    </xsd:element>
-    <xsd:element name="SharingHintHash" ma:index="10" nillable="true" ma:displayName="Sharing Hint Hash" ma:internalName="SharingHintHash" ma:readOnly="true">
-      <xsd:simpleType>
-        <xsd:restriction base="dms:Text"/>
       </xsd:simpleType>
     </xsd:element>
   </xsd:schema>
@@ -8533,5 +8596,5 @@
 </file>
 
 <file path=customXml/itemProps3.xml><?xml version="1.0" encoding="utf-8"?>
-<ds:datastoreItem xmlns:ds="http://schemas.openxmlformats.org/officeDocument/2006/customXml" ds:itemID="{04E7C640-D9DA-4D06-81D0-A30F50F62D71}"/>
+<ds:datastoreItem xmlns:ds="http://schemas.openxmlformats.org/officeDocument/2006/customXml" ds:itemID="{D18627E4-5F75-4458-ABFF-09B94C42E664}"/>
 </file>
</xml_diff>